<commit_message>
Wersja pierwsze 6 obrazków. Uwaga! .pptx rozjeżdża
</commit_message>
<xml_diff>
--- a/friday_presentation.pptx
+++ b/friday_presentation.pptx
@@ -8,24 +8,15 @@
     <p:sldId id="256" r:id="rId2"/>
     <p:sldId id="257" r:id="rId3"/>
     <p:sldId id="258" r:id="rId4"/>
+    <p:sldId id="259" r:id="rId5"/>
+    <p:sldId id="260" r:id="rId6"/>
+    <p:sldId id="261" r:id="rId7"/>
   </p:sldIdLst>
   <p:sldSz cx="18288000" cy="10287000"/>
   <p:notesSz cx="6858000" cy="9144000"/>
   <p:embeddedFontLst>
     <p:embeddedFont>
-      <p:font typeface="Open Sans Extra Bold" panose="020B0604020202020204" charset="0"/>
-      <p:regular r:id="rId5"/>
-    </p:embeddedFont>
-    <p:embeddedFont>
-      <p:font typeface="Playlist Script" panose="020B0604020202020204" charset="0"/>
-      <p:regular r:id="rId6"/>
-    </p:embeddedFont>
-    <p:embeddedFont>
       <p:font typeface="Chewy" panose="020B0604020202020204" charset="0"/>
-      <p:regular r:id="rId7"/>
-    </p:embeddedFont>
-    <p:embeddedFont>
-      <p:font typeface="Montserrat Classic Bold" panose="020B0604020202020204" charset="-18"/>
       <p:regular r:id="rId8"/>
     </p:embeddedFont>
     <p:embeddedFont>
@@ -37,23 +28,47 @@
       <p:regular r:id="rId10"/>
     </p:embeddedFont>
     <p:embeddedFont>
-      <p:font typeface="Montserrat" panose="020B0604020202020204" charset="-18"/>
+      <p:font typeface="Open Sans Bold" panose="020B0604020202020204" charset="0"/>
       <p:regular r:id="rId11"/>
     </p:embeddedFont>
     <p:embeddedFont>
-      <p:font typeface="Sacramento" panose="020B0604020202020204" charset="0"/>
+      <p:font typeface="Berkshire Swash" panose="020B0604020202020204" charset="0"/>
       <p:regular r:id="rId12"/>
     </p:embeddedFont>
     <p:embeddedFont>
-      <p:font typeface="Berkshire Swash" panose="020B0604020202020204" charset="0"/>
+      <p:font typeface="Montserrat Italics" panose="020B0604020202020204" charset="-18"/>
       <p:regular r:id="rId13"/>
     </p:embeddedFont>
     <p:embeddedFont>
+      <p:font typeface="Open Sans Extra Bold" panose="020B0604020202020204" charset="0"/>
+      <p:regular r:id="rId14"/>
+    </p:embeddedFont>
+    <p:embeddedFont>
+      <p:font typeface="Montserrat Classic Bold" panose="020B0604020202020204" charset="-18"/>
+      <p:regular r:id="rId15"/>
+    </p:embeddedFont>
+    <p:embeddedFont>
+      <p:font typeface="Montserrat" panose="020B0604020202020204" charset="-18"/>
+      <p:regular r:id="rId16"/>
+    </p:embeddedFont>
+    <p:embeddedFont>
+      <p:font typeface="Playlist Script" panose="020B0604020202020204" charset="0"/>
+      <p:regular r:id="rId17"/>
+    </p:embeddedFont>
+    <p:embeddedFont>
       <p:font typeface="Calibri" panose="020F0502020204030204" pitchFamily="34" charset="0"/>
-      <p:regular r:id="rId14"/>
-      <p:bold r:id="rId15"/>
-      <p:italic r:id="rId16"/>
-      <p:boldItalic r:id="rId17"/>
+      <p:regular r:id="rId18"/>
+      <p:bold r:id="rId19"/>
+      <p:italic r:id="rId20"/>
+      <p:boldItalic r:id="rId21"/>
+    </p:embeddedFont>
+    <p:embeddedFont>
+      <p:font typeface="Open Sans Bold Italics" panose="020B0604020202020204" charset="0"/>
+      <p:regular r:id="rId22"/>
+    </p:embeddedFont>
+    <p:embeddedFont>
+      <p:font typeface="Sacramento" panose="020B0604020202020204" charset="0"/>
+      <p:regular r:id="rId23"/>
     </p:embeddedFont>
   </p:embeddedFontLst>
   <p:defaultTextStyle>
@@ -3334,15 +3349,15 @@
         </p:nvSpPr>
         <p:spPr>
           <a:xfrm>
-            <a:off x="2699958" y="5700307"/>
-            <a:ext cx="12244389" cy="3770263"/>
+            <a:off x="2665437" y="5350433"/>
+            <a:ext cx="14022363" cy="3770263"/>
           </a:xfrm>
           <a:prstGeom prst="rect">
             <a:avLst/>
           </a:prstGeom>
         </p:spPr>
         <p:txBody>
-          <a:bodyPr lIns="0" tIns="0" rIns="0" bIns="0" rtlCol="0" anchor="t">
+          <a:bodyPr wrap="square" lIns="0" tIns="0" rIns="0" bIns="0" rtlCol="0" anchor="t">
             <a:spAutoFit/>
           </a:bodyPr>
           <a:lstStyle/>
@@ -3362,7 +3377,7 @@
               <a:t>6 </a:t>
             </a:r>
             <a:r>
-              <a:rPr lang="en-US" sz="7000" dirty="0" smtClean="0">
+              <a:rPr lang="en-US" sz="7000" dirty="0">
                 <a:solidFill>
                   <a:srgbClr val="FF1616"/>
                 </a:solidFill>
@@ -3371,7 +3386,7 @@
               <a:t>A</a:t>
             </a:r>
             <a:r>
-              <a:rPr lang="en-US" sz="7000" dirty="0" smtClean="0">
+              <a:rPr lang="en-US" sz="7000" dirty="0">
                 <a:solidFill>
                   <a:srgbClr val="FFDE59"/>
                 </a:solidFill>
@@ -3380,7 +3395,7 @@
               <a:t>W</a:t>
             </a:r>
             <a:r>
-              <a:rPr lang="en-US" sz="7000" dirty="0" smtClean="0">
+              <a:rPr lang="en-US" sz="7000" dirty="0">
                 <a:solidFill>
                   <a:srgbClr val="7ED957"/>
                 </a:solidFill>
@@ -3389,7 +3404,7 @@
               <a:t>E</a:t>
             </a:r>
             <a:r>
-              <a:rPr lang="en-US" sz="7000" dirty="0" smtClean="0">
+              <a:rPr lang="en-US" sz="7000" dirty="0">
                 <a:solidFill>
                   <a:srgbClr val="5CE1E6"/>
                 </a:solidFill>
@@ -3398,7 +3413,7 @@
               <a:t>S</a:t>
             </a:r>
             <a:r>
-              <a:rPr lang="en-US" sz="7000" dirty="0" smtClean="0">
+              <a:rPr lang="en-US" sz="7000" dirty="0">
                 <a:solidFill>
                   <a:srgbClr val="1F3CFF"/>
                 </a:solidFill>
@@ -3407,7 +3422,7 @@
               <a:t>O</a:t>
             </a:r>
             <a:r>
-              <a:rPr lang="en-US" sz="7000" dirty="0" smtClean="0">
+              <a:rPr lang="en-US" sz="7000" dirty="0">
                 <a:solidFill>
                   <a:srgbClr val="FF66C4"/>
                 </a:solidFill>
@@ -3416,7 +3431,7 @@
               <a:t>M</a:t>
             </a:r>
             <a:r>
-              <a:rPr lang="en-US" sz="7000" dirty="0" smtClean="0">
+              <a:rPr lang="en-US" sz="7000" dirty="0">
                 <a:solidFill>
                   <a:srgbClr val="FF1616"/>
                 </a:solidFill>
@@ -3424,12 +3439,6 @@
               </a:rPr>
               <a:t>E</a:t>
             </a:r>
-            <a:endParaRPr lang="pl-PL" sz="7000" dirty="0" smtClean="0">
-              <a:solidFill>
-                <a:srgbClr val="FF1616"/>
-              </a:solidFill>
-              <a:latin typeface="Open Sans Extra Bold"/>
-            </a:endParaRPr>
           </a:p>
           <a:p>
             <a:pPr>
@@ -3438,9 +3447,9 @@
               </a:lnSpc>
             </a:pPr>
             <a:r>
-              <a:rPr lang="pl-PL" sz="7000" dirty="0">
+              <a:rPr lang="pl-PL" sz="7000" dirty="0" smtClean="0">
                 <a:solidFill>
-                  <a:srgbClr val="FF1616"/>
+                  <a:srgbClr val="FFFFFF"/>
                 </a:solidFill>
                 <a:latin typeface="Open Sans Extra Bold"/>
               </a:rPr>
@@ -3453,17 +3462,20 @@
                 </a:solidFill>
                 <a:latin typeface="Open Sans Extra Bold"/>
               </a:rPr>
-              <a:t>BINARY CLASSIFICATION</a:t>
-            </a:r>
-            <a:endParaRPr lang="pl-PL" sz="7000" dirty="0">
-              <a:solidFill>
-                <a:srgbClr val="FFFFFF"/>
-              </a:solidFill>
-              <a:latin typeface="Open Sans Extra Bold"/>
-            </a:endParaRPr>
-          </a:p>
-          <a:p>
-            <a:pPr>
+              <a:t>BINARY </a:t>
+            </a:r>
+            <a:r>
+              <a:rPr lang="en-US" sz="7000" dirty="0">
+                <a:solidFill>
+                  <a:srgbClr val="FFFFFF"/>
+                </a:solidFill>
+                <a:latin typeface="Open Sans Extra Bold"/>
+              </a:rPr>
+              <a:t>CLASSIFICATION</a:t>
+            </a:r>
+          </a:p>
+          <a:p>
+            <a:pPr algn="l">
               <a:lnSpc>
                 <a:spcPts val="9800"/>
               </a:lnSpc>
@@ -4455,6 +4467,1217 @@
 <file path=ppt/slides/slide3.xml><?xml version="1.0" encoding="utf-8"?>
 <p:sld xmlns:a="http://schemas.openxmlformats.org/drawingml/2006/main" xmlns:r="http://schemas.openxmlformats.org/officeDocument/2006/relationships" xmlns:p="http://schemas.openxmlformats.org/presentationml/2006/main">
   <p:cSld>
+    <p:spTree>
+      <p:nvGrpSpPr>
+        <p:cNvPr id="1" name=""/>
+        <p:cNvGrpSpPr/>
+        <p:nvPr/>
+      </p:nvGrpSpPr>
+      <p:grpSpPr>
+        <a:xfrm>
+          <a:off x="0" y="0"/>
+          <a:ext cx="0" cy="0"/>
+          <a:chOff x="0" y="0"/>
+          <a:chExt cx="0" cy="0"/>
+        </a:xfrm>
+      </p:grpSpPr>
+      <p:pic>
+        <p:nvPicPr>
+          <p:cNvPr id="2" name="Picture 2"/>
+          <p:cNvPicPr>
+            <a:picLocks noChangeAspect="1"/>
+          </p:cNvPicPr>
+          <p:nvPr/>
+        </p:nvPicPr>
+        <p:blipFill>
+          <a:blip r:embed="rId2">
+            <a:alphaModFix amt="6999"/>
+          </a:blip>
+          <a:srcRect/>
+          <a:stretch>
+            <a:fillRect/>
+          </a:stretch>
+        </p:blipFill>
+        <p:spPr>
+          <a:xfrm>
+            <a:off x="-151663" y="-363116"/>
+            <a:ext cx="18591325" cy="10764416"/>
+          </a:xfrm>
+          <a:prstGeom prst="rect">
+            <a:avLst/>
+          </a:prstGeom>
+        </p:spPr>
+      </p:pic>
+      <p:pic>
+        <p:nvPicPr>
+          <p:cNvPr id="3" name="Picture 3"/>
+          <p:cNvPicPr>
+            <a:picLocks noChangeAspect="1"/>
+          </p:cNvPicPr>
+          <p:nvPr/>
+        </p:nvPicPr>
+        <p:blipFill>
+          <a:blip r:embed="rId3"/>
+          <a:srcRect/>
+          <a:stretch>
+            <a:fillRect/>
+          </a:stretch>
+        </p:blipFill>
+        <p:spPr>
+          <a:xfrm rot="-662935">
+            <a:off x="4805267" y="132668"/>
+            <a:ext cx="1792063" cy="1792063"/>
+          </a:xfrm>
+          <a:prstGeom prst="rect">
+            <a:avLst/>
+          </a:prstGeom>
+        </p:spPr>
+      </p:pic>
+      <p:pic>
+        <p:nvPicPr>
+          <p:cNvPr id="4" name="Picture 4"/>
+          <p:cNvPicPr>
+            <a:picLocks noChangeAspect="1"/>
+          </p:cNvPicPr>
+          <p:nvPr/>
+        </p:nvPicPr>
+        <p:blipFill>
+          <a:blip r:embed="rId4"/>
+          <a:srcRect/>
+          <a:stretch>
+            <a:fillRect/>
+          </a:stretch>
+        </p:blipFill>
+        <p:spPr>
+          <a:xfrm rot="-646992">
+            <a:off x="3137431" y="2851304"/>
+            <a:ext cx="2993442" cy="1904577"/>
+          </a:xfrm>
+          <a:prstGeom prst="rect">
+            <a:avLst/>
+          </a:prstGeom>
+        </p:spPr>
+      </p:pic>
+      <p:grpSp>
+        <p:nvGrpSpPr>
+          <p:cNvPr id="5" name="Group 5"/>
+          <p:cNvGrpSpPr>
+            <a:grpSpLocks noChangeAspect="1"/>
+          </p:cNvGrpSpPr>
+          <p:nvPr/>
+        </p:nvGrpSpPr>
+        <p:grpSpPr>
+          <a:xfrm>
+            <a:off x="5915611" y="1970307"/>
+            <a:ext cx="219075" cy="219075"/>
+            <a:chOff x="-2540" y="-2540"/>
+            <a:chExt cx="6355080" cy="6355080"/>
+          </a:xfrm>
+        </p:grpSpPr>
+        <p:sp>
+          <p:nvSpPr>
+            <p:cNvPr id="6" name="Freeform 6"/>
+            <p:cNvSpPr/>
+            <p:nvPr/>
+          </p:nvSpPr>
+          <p:spPr>
+            <a:xfrm>
+              <a:off x="-2540" y="-2540"/>
+              <a:ext cx="6355080" cy="6355080"/>
+            </a:xfrm>
+            <a:custGeom>
+              <a:avLst/>
+              <a:gdLst/>
+              <a:ahLst/>
+              <a:cxnLst/>
+              <a:rect l="l" t="t" r="r" b="b"/>
+              <a:pathLst>
+                <a:path w="6355080" h="6355080">
+                  <a:moveTo>
+                    <a:pt x="3177540" y="6355080"/>
+                  </a:moveTo>
+                  <a:cubicBezTo>
+                    <a:pt x="2329180" y="6355080"/>
+                    <a:pt x="1530350" y="6024880"/>
+                    <a:pt x="930910" y="5424170"/>
+                  </a:cubicBezTo>
+                  <a:cubicBezTo>
+                    <a:pt x="330200" y="4824730"/>
+                    <a:pt x="0" y="4025900"/>
+                    <a:pt x="0" y="3177540"/>
+                  </a:cubicBezTo>
+                  <a:cubicBezTo>
+                    <a:pt x="0" y="2329180"/>
+                    <a:pt x="330200" y="1530350"/>
+                    <a:pt x="930910" y="930910"/>
+                  </a:cubicBezTo>
+                  <a:cubicBezTo>
+                    <a:pt x="1530350" y="330200"/>
+                    <a:pt x="2329180" y="0"/>
+                    <a:pt x="3177540" y="0"/>
+                  </a:cubicBezTo>
+                  <a:cubicBezTo>
+                    <a:pt x="4025900" y="0"/>
+                    <a:pt x="4824730" y="330200"/>
+                    <a:pt x="5424170" y="930910"/>
+                  </a:cubicBezTo>
+                  <a:cubicBezTo>
+                    <a:pt x="6024880" y="1531620"/>
+                    <a:pt x="6355080" y="2329180"/>
+                    <a:pt x="6355080" y="3177540"/>
+                  </a:cubicBezTo>
+                  <a:cubicBezTo>
+                    <a:pt x="6355080" y="4025900"/>
+                    <a:pt x="6024880" y="4824730"/>
+                    <a:pt x="5424170" y="5424170"/>
+                  </a:cubicBezTo>
+                  <a:cubicBezTo>
+                    <a:pt x="4824730" y="6024880"/>
+                    <a:pt x="4025900" y="6355080"/>
+                    <a:pt x="3177540" y="6355080"/>
+                  </a:cubicBezTo>
+                  <a:close/>
+                  <a:moveTo>
+                    <a:pt x="3177540" y="190500"/>
+                  </a:moveTo>
+                  <a:cubicBezTo>
+                    <a:pt x="2379980" y="190500"/>
+                    <a:pt x="1629410" y="501650"/>
+                    <a:pt x="1065530" y="1065530"/>
+                  </a:cubicBezTo>
+                  <a:cubicBezTo>
+                    <a:pt x="501650" y="1629410"/>
+                    <a:pt x="190500" y="2379980"/>
+                    <a:pt x="190500" y="3177540"/>
+                  </a:cubicBezTo>
+                  <a:cubicBezTo>
+                    <a:pt x="190500" y="3975100"/>
+                    <a:pt x="501650" y="4725670"/>
+                    <a:pt x="1065530" y="5289550"/>
+                  </a:cubicBezTo>
+                  <a:cubicBezTo>
+                    <a:pt x="1629410" y="5853430"/>
+                    <a:pt x="2379980" y="6164580"/>
+                    <a:pt x="3177540" y="6164580"/>
+                  </a:cubicBezTo>
+                  <a:cubicBezTo>
+                    <a:pt x="3975100" y="6164580"/>
+                    <a:pt x="4725670" y="5853430"/>
+                    <a:pt x="5289550" y="5289550"/>
+                  </a:cubicBezTo>
+                  <a:cubicBezTo>
+                    <a:pt x="5853430" y="4725670"/>
+                    <a:pt x="6164580" y="3975100"/>
+                    <a:pt x="6164580" y="3177540"/>
+                  </a:cubicBezTo>
+                  <a:cubicBezTo>
+                    <a:pt x="6164580" y="2379980"/>
+                    <a:pt x="5853430" y="1629410"/>
+                    <a:pt x="5289550" y="1065530"/>
+                  </a:cubicBezTo>
+                  <a:cubicBezTo>
+                    <a:pt x="4725670" y="501650"/>
+                    <a:pt x="3975100" y="190500"/>
+                    <a:pt x="3177540" y="190500"/>
+                  </a:cubicBezTo>
+                  <a:close/>
+                </a:path>
+              </a:pathLst>
+            </a:custGeom>
+            <a:solidFill>
+              <a:srgbClr val="000000"/>
+            </a:solidFill>
+          </p:spPr>
+        </p:sp>
+      </p:grpSp>
+      <p:grpSp>
+        <p:nvGrpSpPr>
+          <p:cNvPr id="7" name="Group 7"/>
+          <p:cNvGrpSpPr/>
+          <p:nvPr/>
+        </p:nvGrpSpPr>
+        <p:grpSpPr>
+          <a:xfrm>
+            <a:off x="2177807" y="5438192"/>
+            <a:ext cx="4104803" cy="3485286"/>
+            <a:chOff x="0" y="0"/>
+            <a:chExt cx="5473071" cy="4647047"/>
+          </a:xfrm>
+        </p:grpSpPr>
+        <p:sp>
+          <p:nvSpPr>
+            <p:cNvPr id="8" name="TextBox 8"/>
+            <p:cNvSpPr txBox="1"/>
+            <p:nvPr/>
+          </p:nvSpPr>
+          <p:spPr>
+            <a:xfrm>
+              <a:off x="0" y="1014262"/>
+              <a:ext cx="5473071" cy="3632785"/>
+            </a:xfrm>
+            <a:prstGeom prst="rect">
+              <a:avLst/>
+            </a:prstGeom>
+          </p:spPr>
+          <p:txBody>
+            <a:bodyPr lIns="0" tIns="0" rIns="0" bIns="0" rtlCol="0" anchor="t">
+              <a:spAutoFit/>
+            </a:bodyPr>
+            <a:lstStyle/>
+            <a:p>
+              <a:pPr>
+                <a:lnSpc>
+                  <a:spcPts val="3149"/>
+                </a:lnSpc>
+              </a:pPr>
+              <a:r>
+                <a:rPr lang="en-US" sz="2100" u="sng" spc="21">
+                  <a:solidFill>
+                    <a:srgbClr val="111117"/>
+                  </a:solidFill>
+                  <a:latin typeface="Montserrat"/>
+                </a:rPr>
+                <a:t>Naive but not stupid!</a:t>
+              </a:r>
+            </a:p>
+            <a:p>
+              <a:pPr>
+                <a:lnSpc>
+                  <a:spcPts val="3150"/>
+                </a:lnSpc>
+              </a:pPr>
+              <a:r>
+                <a:rPr lang="en-US" sz="2099" spc="20">
+                  <a:solidFill>
+                    <a:srgbClr val="111117"/>
+                  </a:solidFill>
+                  <a:latin typeface="Montserrat"/>
+                </a:rPr>
+                <a:t>A</a:t>
+              </a:r>
+              <a:r>
+                <a:rPr lang="en-US" sz="2100" spc="21">
+                  <a:solidFill>
+                    <a:srgbClr val="111117"/>
+                  </a:solidFill>
+                  <a:latin typeface="Montserrat"/>
+                </a:rPr>
+                <a:t>nother legendary algorithm, which uses the classic Bayesian formula in the field of probability theory and works great especially with independent feautures.</a:t>
+              </a:r>
+            </a:p>
+          </p:txBody>
+        </p:sp>
+        <p:sp>
+          <p:nvSpPr>
+            <p:cNvPr id="9" name="TextBox 9"/>
+            <p:cNvSpPr txBox="1"/>
+            <p:nvPr/>
+          </p:nvSpPr>
+          <p:spPr>
+            <a:xfrm>
+              <a:off x="0" y="-47625"/>
+              <a:ext cx="5473071" cy="533920"/>
+            </a:xfrm>
+            <a:prstGeom prst="rect">
+              <a:avLst/>
+            </a:prstGeom>
+          </p:spPr>
+          <p:txBody>
+            <a:bodyPr lIns="0" tIns="0" rIns="0" bIns="0" rtlCol="0" anchor="t">
+              <a:spAutoFit/>
+            </a:bodyPr>
+            <a:lstStyle/>
+            <a:p>
+              <a:pPr>
+                <a:lnSpc>
+                  <a:spcPts val="3359"/>
+                </a:lnSpc>
+                <a:spcBef>
+                  <a:spcPct val="0"/>
+                </a:spcBef>
+              </a:pPr>
+              <a:r>
+                <a:rPr lang="en-US" sz="2400" spc="24">
+                  <a:solidFill>
+                    <a:srgbClr val="111117"/>
+                  </a:solidFill>
+                  <a:latin typeface="Montserrat Classic Bold"/>
+                </a:rPr>
+                <a:t>NAIVE BAYES</a:t>
+              </a:r>
+            </a:p>
+          </p:txBody>
+        </p:sp>
+      </p:grpSp>
+      <p:grpSp>
+        <p:nvGrpSpPr>
+          <p:cNvPr id="10" name="Group 10"/>
+          <p:cNvGrpSpPr/>
+          <p:nvPr/>
+        </p:nvGrpSpPr>
+        <p:grpSpPr>
+          <a:xfrm>
+            <a:off x="7091598" y="5438192"/>
+            <a:ext cx="4104803" cy="2301684"/>
+            <a:chOff x="0" y="0"/>
+            <a:chExt cx="5473071" cy="3068912"/>
+          </a:xfrm>
+        </p:grpSpPr>
+        <p:sp>
+          <p:nvSpPr>
+            <p:cNvPr id="11" name="TextBox 11"/>
+            <p:cNvSpPr txBox="1"/>
+            <p:nvPr/>
+          </p:nvSpPr>
+          <p:spPr>
+            <a:xfrm>
+              <a:off x="0" y="1014262"/>
+              <a:ext cx="5473071" cy="2054650"/>
+            </a:xfrm>
+            <a:prstGeom prst="rect">
+              <a:avLst/>
+            </a:prstGeom>
+          </p:spPr>
+          <p:txBody>
+            <a:bodyPr lIns="0" tIns="0" rIns="0" bIns="0" rtlCol="0" anchor="t">
+              <a:spAutoFit/>
+            </a:bodyPr>
+            <a:lstStyle/>
+            <a:p>
+              <a:pPr>
+                <a:lnSpc>
+                  <a:spcPts val="3150"/>
+                </a:lnSpc>
+              </a:pPr>
+              <a:r>
+                <a:rPr lang="en-US" sz="2100" spc="21">
+                  <a:solidFill>
+                    <a:srgbClr val="111117"/>
+                  </a:solidFill>
+                  <a:latin typeface="Montserrat"/>
+                </a:rPr>
+                <a:t>a fast and powerful model implementing random foreset for high dimensional data</a:t>
+              </a:r>
+            </a:p>
+          </p:txBody>
+        </p:sp>
+        <p:sp>
+          <p:nvSpPr>
+            <p:cNvPr id="12" name="TextBox 12"/>
+            <p:cNvSpPr txBox="1"/>
+            <p:nvPr/>
+          </p:nvSpPr>
+          <p:spPr>
+            <a:xfrm>
+              <a:off x="0" y="-47625"/>
+              <a:ext cx="5473071" cy="533920"/>
+            </a:xfrm>
+            <a:prstGeom prst="rect">
+              <a:avLst/>
+            </a:prstGeom>
+          </p:spPr>
+          <p:txBody>
+            <a:bodyPr lIns="0" tIns="0" rIns="0" bIns="0" rtlCol="0" anchor="t">
+              <a:spAutoFit/>
+            </a:bodyPr>
+            <a:lstStyle/>
+            <a:p>
+              <a:pPr>
+                <a:lnSpc>
+                  <a:spcPts val="3359"/>
+                </a:lnSpc>
+                <a:spcBef>
+                  <a:spcPct val="0"/>
+                </a:spcBef>
+              </a:pPr>
+              <a:r>
+                <a:rPr lang="en-US" sz="2400" spc="24">
+                  <a:solidFill>
+                    <a:srgbClr val="111117"/>
+                  </a:solidFill>
+                  <a:latin typeface="Montserrat Classic Bold"/>
+                </a:rPr>
+                <a:t>RANGER</a:t>
+              </a:r>
+            </a:p>
+          </p:txBody>
+        </p:sp>
+      </p:grpSp>
+      <p:grpSp>
+        <p:nvGrpSpPr>
+          <p:cNvPr id="13" name="Group 13"/>
+          <p:cNvGrpSpPr/>
+          <p:nvPr/>
+        </p:nvGrpSpPr>
+        <p:grpSpPr>
+          <a:xfrm>
+            <a:off x="11986165" y="5457825"/>
+            <a:ext cx="4104803" cy="4274353"/>
+            <a:chOff x="0" y="0"/>
+            <a:chExt cx="5473071" cy="5699137"/>
+          </a:xfrm>
+        </p:grpSpPr>
+        <p:sp>
+          <p:nvSpPr>
+            <p:cNvPr id="14" name="TextBox 14"/>
+            <p:cNvSpPr txBox="1"/>
+            <p:nvPr/>
+          </p:nvSpPr>
+          <p:spPr>
+            <a:xfrm>
+              <a:off x="0" y="1014262"/>
+              <a:ext cx="5473071" cy="4684875"/>
+            </a:xfrm>
+            <a:prstGeom prst="rect">
+              <a:avLst/>
+            </a:prstGeom>
+          </p:spPr>
+          <p:txBody>
+            <a:bodyPr lIns="0" tIns="0" rIns="0" bIns="0" rtlCol="0" anchor="t">
+              <a:spAutoFit/>
+            </a:bodyPr>
+            <a:lstStyle/>
+            <a:p>
+              <a:pPr>
+                <a:lnSpc>
+                  <a:spcPts val="3150"/>
+                </a:lnSpc>
+              </a:pPr>
+              <a:r>
+                <a:rPr lang="en-US" sz="2100" spc="21">
+                  <a:solidFill>
+                    <a:srgbClr val="111117"/>
+                  </a:solidFill>
+                  <a:latin typeface="Montserrat"/>
+                </a:rPr>
+                <a:t>everyone well known as support vector machine - another strong player, which uses a technique called the kernel trick to transform the data and then based on these transformations finds an optimal boundary between the possible outputs.</a:t>
+              </a:r>
+            </a:p>
+          </p:txBody>
+        </p:sp>
+        <p:sp>
+          <p:nvSpPr>
+            <p:cNvPr id="15" name="TextBox 15"/>
+            <p:cNvSpPr txBox="1"/>
+            <p:nvPr/>
+          </p:nvSpPr>
+          <p:spPr>
+            <a:xfrm>
+              <a:off x="0" y="-47625"/>
+              <a:ext cx="5473071" cy="533920"/>
+            </a:xfrm>
+            <a:prstGeom prst="rect">
+              <a:avLst/>
+            </a:prstGeom>
+          </p:spPr>
+          <p:txBody>
+            <a:bodyPr lIns="0" tIns="0" rIns="0" bIns="0" rtlCol="0" anchor="t">
+              <a:spAutoFit/>
+            </a:bodyPr>
+            <a:lstStyle/>
+            <a:p>
+              <a:pPr>
+                <a:lnSpc>
+                  <a:spcPts val="3359"/>
+                </a:lnSpc>
+                <a:spcBef>
+                  <a:spcPct val="0"/>
+                </a:spcBef>
+              </a:pPr>
+              <a:r>
+                <a:rPr lang="en-US" sz="2400" spc="24">
+                  <a:solidFill>
+                    <a:srgbClr val="111117"/>
+                  </a:solidFill>
+                  <a:latin typeface="Montserrat Classic Bold"/>
+                </a:rPr>
+                <a:t>SVM</a:t>
+              </a:r>
+            </a:p>
+          </p:txBody>
+        </p:sp>
+      </p:grpSp>
+      <p:grpSp>
+        <p:nvGrpSpPr>
+          <p:cNvPr id="16" name="Group 16"/>
+          <p:cNvGrpSpPr/>
+          <p:nvPr/>
+        </p:nvGrpSpPr>
+        <p:grpSpPr>
+          <a:xfrm>
+            <a:off x="7091598" y="1028700"/>
+            <a:ext cx="4104803" cy="1907150"/>
+            <a:chOff x="0" y="0"/>
+            <a:chExt cx="5473071" cy="2542867"/>
+          </a:xfrm>
+        </p:grpSpPr>
+        <p:sp>
+          <p:nvSpPr>
+            <p:cNvPr id="17" name="TextBox 17"/>
+            <p:cNvSpPr txBox="1"/>
+            <p:nvPr/>
+          </p:nvSpPr>
+          <p:spPr>
+            <a:xfrm>
+              <a:off x="0" y="1014262"/>
+              <a:ext cx="5473071" cy="1528605"/>
+            </a:xfrm>
+            <a:prstGeom prst="rect">
+              <a:avLst/>
+            </a:prstGeom>
+          </p:spPr>
+          <p:txBody>
+            <a:bodyPr lIns="0" tIns="0" rIns="0" bIns="0" rtlCol="0" anchor="t">
+              <a:spAutoFit/>
+            </a:bodyPr>
+            <a:lstStyle/>
+            <a:p>
+              <a:pPr>
+                <a:lnSpc>
+                  <a:spcPts val="3150"/>
+                </a:lnSpc>
+              </a:pPr>
+              <a:r>
+                <a:rPr lang="en-US" sz="2100" spc="21">
+                  <a:solidFill>
+                    <a:srgbClr val="111117"/>
+                  </a:solidFill>
+                  <a:latin typeface="Montserrat"/>
+                </a:rPr>
+                <a:t>The epic structural mapping of binary decisions algorithm taken from </a:t>
+              </a:r>
+              <a:r>
+                <a:rPr lang="en-US" sz="2100" spc="21">
+                  <a:solidFill>
+                    <a:srgbClr val="111117"/>
+                  </a:solidFill>
+                  <a:latin typeface="Montserrat Italics"/>
+                </a:rPr>
+                <a:t>rpart</a:t>
+              </a:r>
+              <a:r>
+                <a:rPr lang="en-US" sz="2100" spc="21">
+                  <a:solidFill>
+                    <a:srgbClr val="111117"/>
+                  </a:solidFill>
+                  <a:latin typeface="Montserrat"/>
+                </a:rPr>
+                <a:t> package</a:t>
+              </a:r>
+            </a:p>
+          </p:txBody>
+        </p:sp>
+        <p:sp>
+          <p:nvSpPr>
+            <p:cNvPr id="18" name="TextBox 18"/>
+            <p:cNvSpPr txBox="1"/>
+            <p:nvPr/>
+          </p:nvSpPr>
+          <p:spPr>
+            <a:xfrm>
+              <a:off x="0" y="-47625"/>
+              <a:ext cx="5473071" cy="533920"/>
+            </a:xfrm>
+            <a:prstGeom prst="rect">
+              <a:avLst/>
+            </a:prstGeom>
+          </p:spPr>
+          <p:txBody>
+            <a:bodyPr lIns="0" tIns="0" rIns="0" bIns="0" rtlCol="0" anchor="t">
+              <a:spAutoFit/>
+            </a:bodyPr>
+            <a:lstStyle/>
+            <a:p>
+              <a:pPr>
+                <a:lnSpc>
+                  <a:spcPts val="3359"/>
+                </a:lnSpc>
+                <a:spcBef>
+                  <a:spcPct val="0"/>
+                </a:spcBef>
+              </a:pPr>
+              <a:r>
+                <a:rPr lang="en-US" sz="2400" spc="24">
+                  <a:solidFill>
+                    <a:srgbClr val="111117"/>
+                  </a:solidFill>
+                  <a:latin typeface="Montserrat Classic Bold"/>
+                </a:rPr>
+                <a:t>CLASSIFICATION TREE</a:t>
+              </a:r>
+            </a:p>
+          </p:txBody>
+        </p:sp>
+      </p:grpSp>
+      <p:grpSp>
+        <p:nvGrpSpPr>
+          <p:cNvPr id="19" name="Group 19"/>
+          <p:cNvGrpSpPr/>
+          <p:nvPr/>
+        </p:nvGrpSpPr>
+        <p:grpSpPr>
+          <a:xfrm>
+            <a:off x="11986165" y="1028700"/>
+            <a:ext cx="4104803" cy="2301684"/>
+            <a:chOff x="0" y="0"/>
+            <a:chExt cx="5473071" cy="3068912"/>
+          </a:xfrm>
+        </p:grpSpPr>
+        <p:sp>
+          <p:nvSpPr>
+            <p:cNvPr id="20" name="TextBox 20"/>
+            <p:cNvSpPr txBox="1"/>
+            <p:nvPr/>
+          </p:nvSpPr>
+          <p:spPr>
+            <a:xfrm>
+              <a:off x="0" y="1014262"/>
+              <a:ext cx="5473071" cy="2054650"/>
+            </a:xfrm>
+            <a:prstGeom prst="rect">
+              <a:avLst/>
+            </a:prstGeom>
+          </p:spPr>
+          <p:txBody>
+            <a:bodyPr lIns="0" tIns="0" rIns="0" bIns="0" rtlCol="0" anchor="t">
+              <a:spAutoFit/>
+            </a:bodyPr>
+            <a:lstStyle/>
+            <a:p>
+              <a:pPr>
+                <a:lnSpc>
+                  <a:spcPts val="3150"/>
+                </a:lnSpc>
+              </a:pPr>
+              <a:r>
+                <a:rPr lang="en-US" sz="2100" spc="21">
+                  <a:solidFill>
+                    <a:srgbClr val="111117"/>
+                  </a:solidFill>
+                  <a:latin typeface="Montserrat"/>
+                </a:rPr>
+                <a:t>A classic model attributing     a given observation to              a target ... corresponding                 to its closest  friends in space!</a:t>
+              </a:r>
+            </a:p>
+          </p:txBody>
+        </p:sp>
+        <p:sp>
+          <p:nvSpPr>
+            <p:cNvPr id="21" name="TextBox 21"/>
+            <p:cNvSpPr txBox="1"/>
+            <p:nvPr/>
+          </p:nvSpPr>
+          <p:spPr>
+            <a:xfrm>
+              <a:off x="0" y="-47625"/>
+              <a:ext cx="5473071" cy="533920"/>
+            </a:xfrm>
+            <a:prstGeom prst="rect">
+              <a:avLst/>
+            </a:prstGeom>
+          </p:spPr>
+          <p:txBody>
+            <a:bodyPr lIns="0" tIns="0" rIns="0" bIns="0" rtlCol="0" anchor="t">
+              <a:spAutoFit/>
+            </a:bodyPr>
+            <a:lstStyle/>
+            <a:p>
+              <a:pPr>
+                <a:lnSpc>
+                  <a:spcPts val="3359"/>
+                </a:lnSpc>
+                <a:spcBef>
+                  <a:spcPct val="0"/>
+                </a:spcBef>
+              </a:pPr>
+              <a:r>
+                <a:rPr lang="en-US" sz="2400" spc="24">
+                  <a:solidFill>
+                    <a:srgbClr val="111117"/>
+                  </a:solidFill>
+                  <a:latin typeface="Montserrat Classic Bold"/>
+                </a:rPr>
+                <a:t>K-NEAREST NEIGHBOURS</a:t>
+              </a:r>
+            </a:p>
+          </p:txBody>
+        </p:sp>
+      </p:grpSp>
+      <p:sp>
+        <p:nvSpPr>
+          <p:cNvPr id="22" name="TextBox 22"/>
+          <p:cNvSpPr txBox="1"/>
+          <p:nvPr/>
+        </p:nvSpPr>
+        <p:spPr>
+          <a:xfrm>
+            <a:off x="391605" y="-391691"/>
+            <a:ext cx="1274190" cy="3803010"/>
+          </a:xfrm>
+          <a:prstGeom prst="rect">
+            <a:avLst/>
+          </a:prstGeom>
+        </p:spPr>
+        <p:txBody>
+          <a:bodyPr lIns="0" tIns="0" rIns="0" bIns="0" rtlCol="0" anchor="t">
+            <a:spAutoFit/>
+          </a:bodyPr>
+          <a:lstStyle/>
+          <a:p>
+            <a:pPr>
+              <a:lnSpc>
+                <a:spcPts val="29999"/>
+              </a:lnSpc>
+            </a:pPr>
+            <a:r>
+              <a:rPr lang="en-US" sz="24999" spc="749">
+                <a:solidFill>
+                  <a:srgbClr val="1F3CFF"/>
+                </a:solidFill>
+                <a:latin typeface="Montserrat Classic Bold"/>
+              </a:rPr>
+              <a:t>5</a:t>
+            </a:r>
+          </a:p>
+        </p:txBody>
+      </p:sp>
+      <p:sp>
+        <p:nvSpPr>
+          <p:cNvPr id="23" name="TextBox 23"/>
+          <p:cNvSpPr txBox="1"/>
+          <p:nvPr/>
+        </p:nvSpPr>
+        <p:spPr>
+          <a:xfrm>
+            <a:off x="2622707" y="162314"/>
+            <a:ext cx="2538683" cy="2462213"/>
+          </a:xfrm>
+          <a:prstGeom prst="rect">
+            <a:avLst/>
+          </a:prstGeom>
+        </p:spPr>
+        <p:txBody>
+          <a:bodyPr wrap="square" lIns="0" tIns="0" rIns="0" bIns="0" rtlCol="0" anchor="t">
+            <a:spAutoFit/>
+          </a:bodyPr>
+          <a:lstStyle/>
+          <a:p>
+            <a:pPr>
+              <a:lnSpc>
+                <a:spcPts val="4800"/>
+              </a:lnSpc>
+            </a:pPr>
+            <a:r>
+              <a:rPr lang="en-US" sz="4000" dirty="0">
+                <a:solidFill>
+                  <a:srgbClr val="1F3CFF"/>
+                </a:solidFill>
+                <a:latin typeface="Open Sans Bold"/>
+              </a:rPr>
+              <a:t>epic</a:t>
+            </a:r>
+          </a:p>
+          <a:p>
+            <a:pPr>
+              <a:lnSpc>
+                <a:spcPts val="4800"/>
+              </a:lnSpc>
+            </a:pPr>
+            <a:r>
+              <a:rPr lang="en-US" sz="4000" dirty="0">
+                <a:solidFill>
+                  <a:srgbClr val="1F3CFF"/>
+                </a:solidFill>
+                <a:latin typeface="Open Sans Bold"/>
+              </a:rPr>
+              <a:t>CLASS-</a:t>
+            </a:r>
+          </a:p>
+          <a:p>
+            <a:pPr>
+              <a:lnSpc>
+                <a:spcPts val="4800"/>
+              </a:lnSpc>
+            </a:pPr>
+            <a:r>
+              <a:rPr lang="en-US" sz="4000" dirty="0">
+                <a:solidFill>
+                  <a:srgbClr val="1F3CFF"/>
+                </a:solidFill>
+                <a:latin typeface="Open Sans Bold"/>
+              </a:rPr>
+              <a:t>-</a:t>
+            </a:r>
+            <a:r>
+              <a:rPr lang="en-US" sz="4000" dirty="0" err="1">
+                <a:solidFill>
+                  <a:srgbClr val="1F3CFF"/>
+                </a:solidFill>
+                <a:latin typeface="Open Sans Bold"/>
+              </a:rPr>
+              <a:t>ification</a:t>
+            </a:r>
+            <a:endParaRPr lang="en-US" sz="4000" dirty="0">
+              <a:solidFill>
+                <a:srgbClr val="1F3CFF"/>
+              </a:solidFill>
+              <a:latin typeface="Open Sans Bold"/>
+            </a:endParaRPr>
+          </a:p>
+          <a:p>
+            <a:pPr>
+              <a:lnSpc>
+                <a:spcPts val="4800"/>
+              </a:lnSpc>
+            </a:pPr>
+            <a:r>
+              <a:rPr lang="en-US" sz="4000" dirty="0">
+                <a:solidFill>
+                  <a:srgbClr val="1F3CFF"/>
+                </a:solidFill>
+                <a:latin typeface="Open Sans Bold"/>
+              </a:rPr>
+              <a:t>models</a:t>
+            </a:r>
+          </a:p>
+        </p:txBody>
+      </p:sp>
+      <p:grpSp>
+        <p:nvGrpSpPr>
+          <p:cNvPr id="24" name="Group 24"/>
+          <p:cNvGrpSpPr>
+            <a:grpSpLocks noChangeAspect="1"/>
+          </p:cNvGrpSpPr>
+          <p:nvPr/>
+        </p:nvGrpSpPr>
+        <p:grpSpPr>
+          <a:xfrm>
+            <a:off x="5753686" y="2264243"/>
+            <a:ext cx="323850" cy="323850"/>
+            <a:chOff x="-2540" y="-2540"/>
+            <a:chExt cx="6355080" cy="6355080"/>
+          </a:xfrm>
+        </p:grpSpPr>
+        <p:sp>
+          <p:nvSpPr>
+            <p:cNvPr id="25" name="Freeform 25"/>
+            <p:cNvSpPr/>
+            <p:nvPr/>
+          </p:nvSpPr>
+          <p:spPr>
+            <a:xfrm>
+              <a:off x="-2540" y="-2540"/>
+              <a:ext cx="6355080" cy="6355080"/>
+            </a:xfrm>
+            <a:custGeom>
+              <a:avLst/>
+              <a:gdLst/>
+              <a:ahLst/>
+              <a:cxnLst/>
+              <a:rect l="l" t="t" r="r" b="b"/>
+              <a:pathLst>
+                <a:path w="6355080" h="6355080">
+                  <a:moveTo>
+                    <a:pt x="3177540" y="6355080"/>
+                  </a:moveTo>
+                  <a:cubicBezTo>
+                    <a:pt x="2329180" y="6355080"/>
+                    <a:pt x="1530350" y="6024880"/>
+                    <a:pt x="930910" y="5424170"/>
+                  </a:cubicBezTo>
+                  <a:cubicBezTo>
+                    <a:pt x="330200" y="4824730"/>
+                    <a:pt x="0" y="4025900"/>
+                    <a:pt x="0" y="3177540"/>
+                  </a:cubicBezTo>
+                  <a:cubicBezTo>
+                    <a:pt x="0" y="2329180"/>
+                    <a:pt x="330200" y="1530350"/>
+                    <a:pt x="930910" y="930910"/>
+                  </a:cubicBezTo>
+                  <a:cubicBezTo>
+                    <a:pt x="1530350" y="330200"/>
+                    <a:pt x="2329180" y="0"/>
+                    <a:pt x="3177540" y="0"/>
+                  </a:cubicBezTo>
+                  <a:cubicBezTo>
+                    <a:pt x="4025900" y="0"/>
+                    <a:pt x="4824730" y="330200"/>
+                    <a:pt x="5424170" y="930910"/>
+                  </a:cubicBezTo>
+                  <a:cubicBezTo>
+                    <a:pt x="6024880" y="1531620"/>
+                    <a:pt x="6355080" y="2329180"/>
+                    <a:pt x="6355080" y="3177540"/>
+                  </a:cubicBezTo>
+                  <a:cubicBezTo>
+                    <a:pt x="6355080" y="4025900"/>
+                    <a:pt x="6024880" y="4824730"/>
+                    <a:pt x="5424170" y="5424170"/>
+                  </a:cubicBezTo>
+                  <a:cubicBezTo>
+                    <a:pt x="4824730" y="6024880"/>
+                    <a:pt x="4025900" y="6355080"/>
+                    <a:pt x="3177540" y="6355080"/>
+                  </a:cubicBezTo>
+                  <a:close/>
+                  <a:moveTo>
+                    <a:pt x="3177540" y="190500"/>
+                  </a:moveTo>
+                  <a:cubicBezTo>
+                    <a:pt x="2379980" y="190500"/>
+                    <a:pt x="1629410" y="501650"/>
+                    <a:pt x="1065530" y="1065530"/>
+                  </a:cubicBezTo>
+                  <a:cubicBezTo>
+                    <a:pt x="501650" y="1629410"/>
+                    <a:pt x="190500" y="2379980"/>
+                    <a:pt x="190500" y="3177540"/>
+                  </a:cubicBezTo>
+                  <a:cubicBezTo>
+                    <a:pt x="190500" y="3975100"/>
+                    <a:pt x="501650" y="4725670"/>
+                    <a:pt x="1065530" y="5289550"/>
+                  </a:cubicBezTo>
+                  <a:cubicBezTo>
+                    <a:pt x="1629410" y="5853430"/>
+                    <a:pt x="2379980" y="6164580"/>
+                    <a:pt x="3177540" y="6164580"/>
+                  </a:cubicBezTo>
+                  <a:cubicBezTo>
+                    <a:pt x="3975100" y="6164580"/>
+                    <a:pt x="4725670" y="5853430"/>
+                    <a:pt x="5289550" y="5289550"/>
+                  </a:cubicBezTo>
+                  <a:cubicBezTo>
+                    <a:pt x="5853430" y="4725670"/>
+                    <a:pt x="6164580" y="3975100"/>
+                    <a:pt x="6164580" y="3177540"/>
+                  </a:cubicBezTo>
+                  <a:cubicBezTo>
+                    <a:pt x="6164580" y="2379980"/>
+                    <a:pt x="5853430" y="1629410"/>
+                    <a:pt x="5289550" y="1065530"/>
+                  </a:cubicBezTo>
+                  <a:cubicBezTo>
+                    <a:pt x="4725670" y="501650"/>
+                    <a:pt x="3975100" y="190500"/>
+                    <a:pt x="3177540" y="190500"/>
+                  </a:cubicBezTo>
+                  <a:close/>
+                </a:path>
+              </a:pathLst>
+            </a:custGeom>
+            <a:solidFill>
+              <a:srgbClr val="000000"/>
+            </a:solidFill>
+          </p:spPr>
+        </p:sp>
+      </p:grpSp>
+      <p:grpSp>
+        <p:nvGrpSpPr>
+          <p:cNvPr id="26" name="Group 26"/>
+          <p:cNvGrpSpPr>
+            <a:grpSpLocks noChangeAspect="1"/>
+          </p:cNvGrpSpPr>
+          <p:nvPr/>
+        </p:nvGrpSpPr>
+        <p:grpSpPr>
+          <a:xfrm>
+            <a:off x="5442180" y="2648595"/>
+            <a:ext cx="387705" cy="387705"/>
+            <a:chOff x="-2540" y="-2540"/>
+            <a:chExt cx="6355080" cy="6355080"/>
+          </a:xfrm>
+        </p:grpSpPr>
+        <p:sp>
+          <p:nvSpPr>
+            <p:cNvPr id="27" name="Freeform 27"/>
+            <p:cNvSpPr/>
+            <p:nvPr/>
+          </p:nvSpPr>
+          <p:spPr>
+            <a:xfrm>
+              <a:off x="-2540" y="-2540"/>
+              <a:ext cx="6355080" cy="6355080"/>
+            </a:xfrm>
+            <a:custGeom>
+              <a:avLst/>
+              <a:gdLst/>
+              <a:ahLst/>
+              <a:cxnLst/>
+              <a:rect l="l" t="t" r="r" b="b"/>
+              <a:pathLst>
+                <a:path w="6355080" h="6355080">
+                  <a:moveTo>
+                    <a:pt x="3177540" y="6355080"/>
+                  </a:moveTo>
+                  <a:cubicBezTo>
+                    <a:pt x="2329180" y="6355080"/>
+                    <a:pt x="1530350" y="6024880"/>
+                    <a:pt x="930910" y="5424170"/>
+                  </a:cubicBezTo>
+                  <a:cubicBezTo>
+                    <a:pt x="330200" y="4824730"/>
+                    <a:pt x="0" y="4025900"/>
+                    <a:pt x="0" y="3177540"/>
+                  </a:cubicBezTo>
+                  <a:cubicBezTo>
+                    <a:pt x="0" y="2329180"/>
+                    <a:pt x="330200" y="1530350"/>
+                    <a:pt x="930910" y="930910"/>
+                  </a:cubicBezTo>
+                  <a:cubicBezTo>
+                    <a:pt x="1530350" y="330200"/>
+                    <a:pt x="2329180" y="0"/>
+                    <a:pt x="3177540" y="0"/>
+                  </a:cubicBezTo>
+                  <a:cubicBezTo>
+                    <a:pt x="4025900" y="0"/>
+                    <a:pt x="4824730" y="330200"/>
+                    <a:pt x="5424170" y="930910"/>
+                  </a:cubicBezTo>
+                  <a:cubicBezTo>
+                    <a:pt x="6024880" y="1531620"/>
+                    <a:pt x="6355080" y="2329180"/>
+                    <a:pt x="6355080" y="3177540"/>
+                  </a:cubicBezTo>
+                  <a:cubicBezTo>
+                    <a:pt x="6355080" y="4025900"/>
+                    <a:pt x="6024880" y="4824730"/>
+                    <a:pt x="5424170" y="5424170"/>
+                  </a:cubicBezTo>
+                  <a:cubicBezTo>
+                    <a:pt x="4824730" y="6024880"/>
+                    <a:pt x="4025900" y="6355080"/>
+                    <a:pt x="3177540" y="6355080"/>
+                  </a:cubicBezTo>
+                  <a:close/>
+                  <a:moveTo>
+                    <a:pt x="3177540" y="190500"/>
+                  </a:moveTo>
+                  <a:cubicBezTo>
+                    <a:pt x="2379980" y="190500"/>
+                    <a:pt x="1629410" y="501650"/>
+                    <a:pt x="1065530" y="1065530"/>
+                  </a:cubicBezTo>
+                  <a:cubicBezTo>
+                    <a:pt x="501650" y="1629410"/>
+                    <a:pt x="190500" y="2379980"/>
+                    <a:pt x="190500" y="3177540"/>
+                  </a:cubicBezTo>
+                  <a:cubicBezTo>
+                    <a:pt x="190500" y="3975100"/>
+                    <a:pt x="501650" y="4725670"/>
+                    <a:pt x="1065530" y="5289550"/>
+                  </a:cubicBezTo>
+                  <a:cubicBezTo>
+                    <a:pt x="1629410" y="5853430"/>
+                    <a:pt x="2379980" y="6164580"/>
+                    <a:pt x="3177540" y="6164580"/>
+                  </a:cubicBezTo>
+                  <a:cubicBezTo>
+                    <a:pt x="3975100" y="6164580"/>
+                    <a:pt x="4725670" y="5853430"/>
+                    <a:pt x="5289550" y="5289550"/>
+                  </a:cubicBezTo>
+                  <a:cubicBezTo>
+                    <a:pt x="5853430" y="4725670"/>
+                    <a:pt x="6164580" y="3975100"/>
+                    <a:pt x="6164580" y="3177540"/>
+                  </a:cubicBezTo>
+                  <a:cubicBezTo>
+                    <a:pt x="6164580" y="2379980"/>
+                    <a:pt x="5853430" y="1629410"/>
+                    <a:pt x="5289550" y="1065530"/>
+                  </a:cubicBezTo>
+                  <a:cubicBezTo>
+                    <a:pt x="4725670" y="501650"/>
+                    <a:pt x="3975100" y="190500"/>
+                    <a:pt x="3177540" y="190500"/>
+                  </a:cubicBezTo>
+                  <a:close/>
+                </a:path>
+              </a:pathLst>
+            </a:custGeom>
+            <a:solidFill>
+              <a:srgbClr val="000000"/>
+            </a:solidFill>
+          </p:spPr>
+        </p:sp>
+      </p:grpSp>
+      <p:sp>
+        <p:nvSpPr>
+          <p:cNvPr id="28" name="TextBox 28"/>
+          <p:cNvSpPr txBox="1"/>
+          <p:nvPr/>
+        </p:nvSpPr>
+        <p:spPr>
+          <a:xfrm rot="-757682">
+            <a:off x="3392395" y="3404403"/>
+            <a:ext cx="2383324" cy="761110"/>
+          </a:xfrm>
+          <a:prstGeom prst="rect">
+            <a:avLst/>
+          </a:prstGeom>
+        </p:spPr>
+        <p:txBody>
+          <a:bodyPr lIns="0" tIns="0" rIns="0" bIns="0" rtlCol="0" anchor="t">
+            <a:spAutoFit/>
+          </a:bodyPr>
+          <a:lstStyle/>
+          <a:p>
+            <a:pPr algn="ctr">
+              <a:lnSpc>
+                <a:spcPts val="3079"/>
+              </a:lnSpc>
+            </a:pPr>
+            <a:r>
+              <a:rPr lang="en-US" sz="2200">
+                <a:solidFill>
+                  <a:srgbClr val="1F3CFF"/>
+                </a:solidFill>
+                <a:latin typeface="Open Sans Bold Italics"/>
+              </a:rPr>
+              <a:t>Damn...</a:t>
+            </a:r>
+          </a:p>
+          <a:p>
+            <a:pPr algn="ctr">
+              <a:lnSpc>
+                <a:spcPts val="3079"/>
+              </a:lnSpc>
+            </a:pPr>
+            <a:r>
+              <a:rPr lang="en-US" sz="2200">
+                <a:solidFill>
+                  <a:srgbClr val="1F3CFF"/>
+                </a:solidFill>
+                <a:latin typeface="Open Sans Bold Italics"/>
+              </a:rPr>
+              <a:t>so much class!</a:t>
+            </a:r>
+          </a:p>
+        </p:txBody>
+      </p:sp>
+    </p:spTree>
+  </p:cSld>
+  <p:clrMapOvr>
+    <a:masterClrMapping/>
+  </p:clrMapOvr>
+  <p:timing>
+    <p:tnLst>
+      <p:par>
+        <p:cTn id="1" dur="indefinite" restart="never" nodeType="tmRoot"/>
+      </p:par>
+    </p:tnLst>
+  </p:timing>
+</p:sld>
+</file>
+
+<file path=ppt/slides/slide4.xml><?xml version="1.0" encoding="utf-8"?>
+<p:sld xmlns:a="http://schemas.openxmlformats.org/drawingml/2006/main" xmlns:r="http://schemas.openxmlformats.org/officeDocument/2006/relationships" xmlns:p="http://schemas.openxmlformats.org/presentationml/2006/main">
+  <p:cSld>
     <p:bg>
       <p:bgPr>
         <a:solidFill>
@@ -4570,7 +5793,7 @@
                 </a:lnSpc>
               </a:pPr>
               <a:r>
-                <a:rPr lang="en-US" sz="1800" spc="18" dirty="0">
+                <a:rPr lang="en-US" sz="1800" spc="18">
                   <a:solidFill>
                     <a:srgbClr val="FFFFFF"/>
                   </a:solidFill>
@@ -4630,10 +5853,10 @@
         </p:nvGrpSpPr>
         <p:grpSpPr>
           <a:xfrm>
-            <a:off x="13023066" y="1315313"/>
-            <a:ext cx="4236234" cy="1703295"/>
-            <a:chOff x="0" y="-57150"/>
-            <a:chExt cx="5648312" cy="2271060"/>
+            <a:off x="13023066" y="1358175"/>
+            <a:ext cx="4236234" cy="1660433"/>
+            <a:chOff x="0" y="0"/>
+            <a:chExt cx="5648312" cy="2213911"/>
           </a:xfrm>
         </p:grpSpPr>
         <p:sp>
@@ -4644,7 +5867,7 @@
           </p:nvSpPr>
           <p:spPr>
             <a:xfrm>
-              <a:off x="0" y="877714"/>
+              <a:off x="0" y="877715"/>
               <a:ext cx="5648312" cy="1336196"/>
             </a:xfrm>
             <a:prstGeom prst="rect">
@@ -4663,7 +5886,7 @@
                 </a:lnSpc>
               </a:pPr>
               <a:r>
-                <a:rPr lang="en-US" sz="1800" spc="18" dirty="0">
+                <a:rPr lang="en-US" sz="1800" spc="18">
                   <a:solidFill>
                     <a:srgbClr val="FFFFFF"/>
                   </a:solidFill>
@@ -4723,10 +5946,10 @@
         </p:nvGrpSpPr>
         <p:grpSpPr>
           <a:xfrm>
-            <a:off x="7645930" y="7201134"/>
-            <a:ext cx="4236234" cy="1295166"/>
-            <a:chOff x="0" y="-47625"/>
-            <a:chExt cx="5648312" cy="1726888"/>
+            <a:off x="7645930" y="6912624"/>
+            <a:ext cx="4236234" cy="1259447"/>
+            <a:chOff x="0" y="0"/>
+            <a:chExt cx="5648312" cy="1679263"/>
           </a:xfrm>
         </p:grpSpPr>
         <p:sp>
@@ -4756,7 +5979,7 @@
                 </a:lnSpc>
               </a:pPr>
               <a:r>
-                <a:rPr lang="en-US" sz="1800" spc="18" dirty="0">
+                <a:rPr lang="en-US" sz="1800" spc="18">
                   <a:solidFill>
                     <a:srgbClr val="FFFFFF"/>
                   </a:solidFill>
@@ -4796,22 +6019,13 @@
                 <a:buChar char="•"/>
               </a:pPr>
               <a:r>
-                <a:rPr lang="en-US" sz="2400" spc="24" dirty="0" err="1">
+                <a:rPr lang="en-US" sz="2400" spc="24">
                   <a:solidFill>
                     <a:srgbClr val="FFFFFF"/>
                   </a:solidFill>
                   <a:latin typeface="Montserrat Classic"/>
                 </a:rPr>
-                <a:t>missForest</a:t>
-              </a:r>
-              <a:r>
-                <a:rPr lang="en-US" sz="2400" spc="24" dirty="0">
-                  <a:solidFill>
-                    <a:srgbClr val="FFFFFF"/>
-                  </a:solidFill>
-                  <a:latin typeface="Montserrat Classic"/>
-                </a:rPr>
-                <a:t> imputation</a:t>
+                <a:t>missForest imputation</a:t>
               </a:r>
             </a:p>
           </p:txBody>
@@ -4825,10 +6039,10 @@
         </p:nvGrpSpPr>
         <p:grpSpPr>
           <a:xfrm>
-            <a:off x="13023066" y="7138743"/>
-            <a:ext cx="4236234" cy="1014786"/>
-            <a:chOff x="0" y="-57149"/>
-            <a:chExt cx="5648312" cy="1353048"/>
+            <a:off x="13023066" y="6912624"/>
+            <a:ext cx="4236234" cy="1605184"/>
+            <a:chOff x="0" y="0"/>
+            <a:chExt cx="5648312" cy="2140245"/>
           </a:xfrm>
         </p:grpSpPr>
         <p:sp>
@@ -4839,8 +6053,8 @@
           </p:nvSpPr>
           <p:spPr>
             <a:xfrm>
-              <a:off x="0" y="873562"/>
-              <a:ext cx="5648312" cy="422337"/>
+              <a:off x="0" y="804049"/>
+              <a:ext cx="5648312" cy="1336196"/>
             </a:xfrm>
             <a:prstGeom prst="rect">
               <a:avLst/>
@@ -4857,12 +6071,33 @@
                   <a:spcPts val="2700"/>
                 </a:lnSpc>
               </a:pPr>
-              <a:endParaRPr lang="en-US" sz="1800" spc="18" dirty="0">
-                <a:solidFill>
-                  <a:srgbClr val="FFFFFF"/>
-                </a:solidFill>
-                <a:latin typeface="Montserrat"/>
-              </a:endParaRPr>
+              <a:r>
+                <a:rPr lang="en-US" sz="1800" spc="18">
+                  <a:solidFill>
+                    <a:srgbClr val="FFFFFF"/>
+                  </a:solidFill>
+                  <a:latin typeface="Montserrat"/>
+                </a:rPr>
+                <a:t>Legendary k-nearest neighbors imputation algorithm taken from the great </a:t>
+              </a:r>
+              <a:r>
+                <a:rPr lang="en-US" sz="1800" spc="18">
+                  <a:solidFill>
+                    <a:srgbClr val="FFFFFF"/>
+                  </a:solidFill>
+                  <a:latin typeface="Montserrat Italics"/>
+                </a:rPr>
+                <a:t>VIM </a:t>
+              </a:r>
+              <a:r>
+                <a:rPr lang="en-US" sz="1800" spc="18">
+                  <a:solidFill>
+                    <a:srgbClr val="FFFFFF"/>
+                  </a:solidFill>
+                  <a:latin typeface="Montserrat"/>
+                </a:rPr>
+                <a:t>package</a:t>
+              </a:r>
             </a:p>
           </p:txBody>
         </p:sp>
@@ -4874,8 +6109,8 @@
           </p:nvSpPr>
           <p:spPr>
             <a:xfrm>
-              <a:off x="0" y="-57149"/>
-              <a:ext cx="5648312" cy="579732"/>
+              <a:off x="0" y="-47625"/>
+              <a:ext cx="5648312" cy="533920"/>
             </a:xfrm>
             <a:prstGeom prst="rect">
               <a:avLst/>
@@ -4887,37 +6122,22 @@
             </a:bodyPr>
             <a:lstStyle/>
             <a:p>
-              <a:pPr marL="462280" lvl="1" indent="-231140">
+              <a:pPr marL="396240" lvl="1" indent="-198120">
                 <a:lnSpc>
-                  <a:spcPts val="3919"/>
+                  <a:spcPts val="3359"/>
                 </a:lnSpc>
                 <a:buFont typeface="Arial"/>
                 <a:buChar char="•"/>
               </a:pPr>
               <a:r>
-                <a:rPr lang="en-US" sz="2400" spc="28" dirty="0">
+                <a:rPr lang="en-US" sz="2400" spc="24">
                   <a:solidFill>
                     <a:srgbClr val="FFFFFF"/>
                   </a:solidFill>
                   <a:latin typeface="Montserrat Classic"/>
                 </a:rPr>
-                <a:t>VIM's </a:t>
+                <a:t>VIM's knn</a:t>
               </a:r>
-              <a:r>
-                <a:rPr lang="en-US" sz="2400" spc="28" dirty="0" err="1">
-                  <a:solidFill>
-                    <a:srgbClr val="FFFFFF"/>
-                  </a:solidFill>
-                  <a:latin typeface="Montserrat Classic"/>
-                </a:rPr>
-                <a:t>knn</a:t>
-              </a:r>
-              <a:endParaRPr lang="en-US" sz="2400" spc="28" dirty="0">
-                <a:solidFill>
-                  <a:srgbClr val="FFFFFF"/>
-                </a:solidFill>
-                <a:latin typeface="Montserrat Classic"/>
-              </a:endParaRPr>
             </a:p>
           </p:txBody>
         </p:sp>
@@ -5000,10 +6220,10 @@
         </p:nvGrpSpPr>
         <p:grpSpPr>
           <a:xfrm>
-            <a:off x="7645930" y="3894900"/>
-            <a:ext cx="4236234" cy="2087320"/>
-            <a:chOff x="0" y="-47625"/>
-            <a:chExt cx="5648312" cy="2783093"/>
+            <a:off x="7645930" y="3970662"/>
+            <a:ext cx="4236234" cy="1944690"/>
+            <a:chOff x="0" y="0"/>
+            <a:chExt cx="5648312" cy="2592920"/>
           </a:xfrm>
         </p:grpSpPr>
         <p:sp>
@@ -5015,7 +6235,7 @@
           <p:spPr>
             <a:xfrm>
               <a:off x="0" y="799896"/>
-              <a:ext cx="5648312" cy="1935572"/>
+              <a:ext cx="5648312" cy="1793024"/>
             </a:xfrm>
             <a:prstGeom prst="rect">
               <a:avLst/>
@@ -5029,11 +6249,11 @@
             <a:p>
               <a:pPr>
                 <a:lnSpc>
-                  <a:spcPts val="2850"/>
+                  <a:spcPts val="2700"/>
                 </a:lnSpc>
               </a:pPr>
               <a:r>
-                <a:rPr lang="en-US" spc="19" dirty="0">
+                <a:rPr lang="en-US" sz="1800" spc="18">
                   <a:solidFill>
                     <a:srgbClr val="FFFFFF"/>
                   </a:solidFill>
@@ -5073,7 +6293,7 @@
                 <a:buChar char="•"/>
               </a:pPr>
               <a:r>
-                <a:rPr lang="en-US" sz="2400" spc="24" dirty="0">
+                <a:rPr lang="en-US" sz="2400" spc="24">
                   <a:solidFill>
                     <a:srgbClr val="FFFFFF"/>
                   </a:solidFill>
@@ -5093,10 +6313,10 @@
         </p:nvGrpSpPr>
         <p:grpSpPr>
           <a:xfrm>
-            <a:off x="12985852" y="3879976"/>
-            <a:ext cx="4236234" cy="1017901"/>
-            <a:chOff x="0" y="-57149"/>
-            <a:chExt cx="5648312" cy="1357201"/>
+            <a:off x="13023066" y="3970662"/>
+            <a:ext cx="4236234" cy="2290426"/>
+            <a:chOff x="0" y="0"/>
+            <a:chExt cx="5648312" cy="3053902"/>
           </a:xfrm>
         </p:grpSpPr>
         <p:sp>
@@ -5107,8 +6327,8 @@
           </p:nvSpPr>
           <p:spPr>
             <a:xfrm>
-              <a:off x="0" y="877715"/>
-              <a:ext cx="5648312" cy="422337"/>
+              <a:off x="0" y="804049"/>
+              <a:ext cx="5648312" cy="2249853"/>
             </a:xfrm>
             <a:prstGeom prst="rect">
               <a:avLst/>
@@ -5125,12 +6345,15 @@
                   <a:spcPts val="2700"/>
                 </a:lnSpc>
               </a:pPr>
-              <a:endParaRPr lang="en-US" sz="1800" spc="18" dirty="0">
-                <a:solidFill>
-                  <a:srgbClr val="FFFFFF"/>
-                </a:solidFill>
-                <a:latin typeface="Montserrat"/>
-              </a:endParaRPr>
+              <a:r>
+                <a:rPr lang="en-US" sz="1800" spc="18">
+                  <a:solidFill>
+                    <a:srgbClr val="FFFFFF"/>
+                  </a:solidFill>
+                  <a:latin typeface="Montserrat"/>
+                </a:rPr>
+                <a:t>Creates multiple imputations for multivariate missing data, based on Fully Conditional Specification, where each incomplete variable is imputed by a separate model.</a:t>
+              </a:r>
             </a:p>
           </p:txBody>
         </p:sp>
@@ -5142,28 +6365,28 @@
           </p:nvSpPr>
           <p:spPr>
             <a:xfrm>
-              <a:off x="0" y="-57149"/>
-              <a:ext cx="5648312" cy="666849"/>
+              <a:off x="0" y="-47625"/>
+              <a:ext cx="5648312" cy="533920"/>
             </a:xfrm>
             <a:prstGeom prst="rect">
               <a:avLst/>
             </a:prstGeom>
           </p:spPr>
           <p:txBody>
-            <a:bodyPr wrap="square" lIns="0" tIns="0" rIns="0" bIns="0" rtlCol="0" anchor="t">
+            <a:bodyPr lIns="0" tIns="0" rIns="0" bIns="0" rtlCol="0" anchor="t">
               <a:spAutoFit/>
             </a:bodyPr>
             <a:lstStyle/>
             <a:p>
-              <a:pPr marL="462280" lvl="1" indent="-231140">
+              <a:pPr marL="396240" lvl="1" indent="-198120">
                 <a:lnSpc>
-                  <a:spcPts val="3919"/>
+                  <a:spcPts val="3359"/>
                 </a:lnSpc>
                 <a:buFont typeface="Arial"/>
                 <a:buChar char="•"/>
               </a:pPr>
               <a:r>
-                <a:rPr lang="en-US" sz="2400" spc="28" dirty="0">
+                <a:rPr lang="en-US" sz="2400" spc="24">
                   <a:solidFill>
                     <a:srgbClr val="FFFFFF"/>
                   </a:solidFill>
@@ -5175,60 +6398,81 @@
           </p:txBody>
         </p:sp>
       </p:grpSp>
-      <p:sp>
-        <p:nvSpPr>
-          <p:cNvPr id="26" name="TextBox 18"/>
-          <p:cNvSpPr txBox="1"/>
+    </p:spTree>
+  </p:cSld>
+  <p:clrMapOvr>
+    <a:masterClrMapping/>
+  </p:clrMapOvr>
+  <p:timing>
+    <p:tnLst>
+      <p:par>
+        <p:cTn id="1" dur="indefinite" restart="never" nodeType="tmRoot"/>
+      </p:par>
+    </p:tnLst>
+  </p:timing>
+</p:sld>
+</file>
+
+<file path=ppt/slides/slide5.xml><?xml version="1.0" encoding="utf-8"?>
+<p:sld xmlns:a="http://schemas.openxmlformats.org/drawingml/2006/main" xmlns:r="http://schemas.openxmlformats.org/officeDocument/2006/relationships" xmlns:p="http://schemas.openxmlformats.org/presentationml/2006/main">
+  <p:cSld>
+    <p:bg>
+      <p:bgPr>
+        <a:solidFill>
+          <a:srgbClr val="1F3CFF"/>
+        </a:solidFill>
+        <a:effectLst/>
+      </p:bgPr>
+    </p:bg>
+    <p:spTree>
+      <p:nvGrpSpPr>
+        <p:cNvPr id="1" name=""/>
+        <p:cNvGrpSpPr/>
+        <p:nvPr/>
+      </p:nvGrpSpPr>
+      <p:grpSpPr>
+        <a:xfrm>
+          <a:off x="0" y="0"/>
+          <a:ext cx="0" cy="0"/>
+          <a:chOff x="0" y="0"/>
+          <a:chExt cx="0" cy="0"/>
+        </a:xfrm>
+      </p:grpSpPr>
+      <p:pic>
+        <p:nvPicPr>
+          <p:cNvPr id="2" name="Picture 2"/>
+          <p:cNvPicPr>
+            <a:picLocks noChangeAspect="1"/>
+          </p:cNvPicPr>
           <p:nvPr/>
-        </p:nvSpPr>
+        </p:nvPicPr>
+        <p:blipFill>
+          <a:blip r:embed="rId2"/>
+          <a:srcRect/>
+          <a:stretch>
+            <a:fillRect/>
+          </a:stretch>
+        </p:blipFill>
         <p:spPr>
           <a:xfrm>
-            <a:off x="12985852" y="4581124"/>
-            <a:ext cx="4236234" cy="1701748"/>
+            <a:off x="0" y="-17841"/>
+            <a:ext cx="18288000" cy="10304841"/>
           </a:xfrm>
           <a:prstGeom prst="rect">
             <a:avLst/>
           </a:prstGeom>
         </p:spPr>
-        <p:txBody>
-          <a:bodyPr lIns="0" tIns="0" rIns="0" bIns="0" rtlCol="0" anchor="t">
-            <a:spAutoFit/>
-          </a:bodyPr>
-          <a:lstStyle/>
-          <a:p>
-            <a:pPr>
-              <a:lnSpc>
-                <a:spcPts val="2700"/>
-              </a:lnSpc>
-            </a:pPr>
-            <a:r>
-              <a:rPr lang="en-US" spc="18" dirty="0">
-                <a:solidFill>
-                  <a:srgbClr val="FFFFFF"/>
-                </a:solidFill>
-                <a:latin typeface="Montserrat"/>
-              </a:rPr>
-              <a:t>Creates multiple imputations for multivariate missing data, based on Fully Conditional Specification, where each incomplete variable is imputed by a separate model.</a:t>
-            </a:r>
-            <a:endParaRPr lang="en-US" spc="18" dirty="0">
-              <a:solidFill>
-                <a:srgbClr val="FFFFFF"/>
-              </a:solidFill>
-              <a:latin typeface="Montserrat"/>
-            </a:endParaRPr>
-          </a:p>
-        </p:txBody>
-      </p:sp>
-      <p:sp>
-        <p:nvSpPr>
-          <p:cNvPr id="27" name="TextBox 11"/>
+      </p:pic>
+      <p:sp>
+        <p:nvSpPr>
+          <p:cNvPr id="3" name="TextBox 3"/>
           <p:cNvSpPr txBox="1"/>
           <p:nvPr/>
         </p:nvSpPr>
         <p:spPr>
           <a:xfrm>
-            <a:off x="12980536" y="7836775"/>
-            <a:ext cx="4236234" cy="1009251"/>
+            <a:off x="3241055" y="2713822"/>
+            <a:ext cx="11805889" cy="4370161"/>
           </a:xfrm>
           <a:prstGeom prst="rect">
             <a:avLst/>
@@ -5240,29 +6484,533 @@
           </a:bodyPr>
           <a:lstStyle/>
           <a:p>
-            <a:pPr>
+            <a:pPr algn="ctr">
               <a:lnSpc>
-                <a:spcPts val="2700"/>
+                <a:spcPts val="8640"/>
               </a:lnSpc>
             </a:pPr>
             <a:r>
-              <a:rPr lang="en-US" spc="18" dirty="0">
+              <a:rPr lang="en-US" sz="7200" spc="504">
                 <a:solidFill>
                   <a:srgbClr val="FFFFFF"/>
                 </a:solidFill>
-                <a:latin typeface="Montserrat"/>
+                <a:latin typeface="Montserrat Classic Bold"/>
               </a:rPr>
-              <a:t>Legendary k-nearest neighbors imputation algorithm taken from the great VIM package</a:t>
-            </a:r>
-            <a:endParaRPr lang="en-US" spc="18" dirty="0">
-              <a:solidFill>
-                <a:srgbClr val="FFFFFF"/>
-              </a:solidFill>
-              <a:latin typeface="Montserrat"/>
-            </a:endParaRPr>
-          </a:p>
-        </p:txBody>
-      </p:sp>
+              <a:t>BUT WHICH WILL TURN OUT TO BE THE BEST AND WILL WIN THIS AMAZING RACE?</a:t>
+            </a:r>
+          </a:p>
+        </p:txBody>
+      </p:sp>
+      <p:pic>
+        <p:nvPicPr>
+          <p:cNvPr id="4" name="Picture 4"/>
+          <p:cNvPicPr>
+            <a:picLocks noChangeAspect="1"/>
+          </p:cNvPicPr>
+          <p:nvPr/>
+        </p:nvPicPr>
+        <p:blipFill>
+          <a:blip r:embed="rId3"/>
+          <a:srcRect/>
+          <a:stretch>
+            <a:fillRect/>
+          </a:stretch>
+        </p:blipFill>
+        <p:spPr>
+          <a:xfrm>
+            <a:off x="373749" y="7083983"/>
+            <a:ext cx="2867306" cy="2867306"/>
+          </a:xfrm>
+          <a:prstGeom prst="rect">
+            <a:avLst/>
+          </a:prstGeom>
+        </p:spPr>
+      </p:pic>
+      <p:pic>
+        <p:nvPicPr>
+          <p:cNvPr id="5" name="Picture 5"/>
+          <p:cNvPicPr>
+            <a:picLocks noChangeAspect="1"/>
+          </p:cNvPicPr>
+          <p:nvPr/>
+        </p:nvPicPr>
+        <p:blipFill>
+          <a:blip r:embed="rId4"/>
+          <a:srcRect/>
+          <a:stretch>
+            <a:fillRect/>
+          </a:stretch>
+        </p:blipFill>
+        <p:spPr>
+          <a:xfrm>
+            <a:off x="15046945" y="464885"/>
+            <a:ext cx="2628900" cy="2628900"/>
+          </a:xfrm>
+          <a:prstGeom prst="rect">
+            <a:avLst/>
+          </a:prstGeom>
+        </p:spPr>
+      </p:pic>
+    </p:spTree>
+  </p:cSld>
+  <p:clrMapOvr>
+    <a:masterClrMapping/>
+  </p:clrMapOvr>
+  <p:timing>
+    <p:tnLst>
+      <p:par>
+        <p:cTn id="1" dur="indefinite" restart="never" nodeType="tmRoot"/>
+      </p:par>
+    </p:tnLst>
+  </p:timing>
+</p:sld>
+</file>
+
+<file path=ppt/slides/slide6.xml><?xml version="1.0" encoding="utf-8"?>
+<p:sld xmlns:a="http://schemas.openxmlformats.org/drawingml/2006/main" xmlns:r="http://schemas.openxmlformats.org/officeDocument/2006/relationships" xmlns:p="http://schemas.openxmlformats.org/presentationml/2006/main">
+  <p:cSld>
+    <p:spTree>
+      <p:nvGrpSpPr>
+        <p:cNvPr id="1" name=""/>
+        <p:cNvGrpSpPr/>
+        <p:nvPr/>
+      </p:nvGrpSpPr>
+      <p:grpSpPr>
+        <a:xfrm>
+          <a:off x="0" y="0"/>
+          <a:ext cx="0" cy="0"/>
+          <a:chOff x="0" y="0"/>
+          <a:chExt cx="0" cy="0"/>
+        </a:xfrm>
+      </p:grpSpPr>
+      <p:pic>
+        <p:nvPicPr>
+          <p:cNvPr id="2" name="Picture 2"/>
+          <p:cNvPicPr>
+            <a:picLocks noChangeAspect="1"/>
+          </p:cNvPicPr>
+          <p:nvPr/>
+        </p:nvPicPr>
+        <p:blipFill>
+          <a:blip r:embed="rId2">
+            <a:alphaModFix amt="9999"/>
+          </a:blip>
+          <a:srcRect/>
+          <a:stretch>
+            <a:fillRect/>
+          </a:stretch>
+        </p:blipFill>
+        <p:spPr>
+          <a:xfrm>
+            <a:off x="-418331" y="-244605"/>
+            <a:ext cx="18911697" cy="10709850"/>
+          </a:xfrm>
+          <a:prstGeom prst="rect">
+            <a:avLst/>
+          </a:prstGeom>
+        </p:spPr>
+      </p:pic>
+      <p:grpSp>
+        <p:nvGrpSpPr>
+          <p:cNvPr id="3" name="Group 3"/>
+          <p:cNvGrpSpPr/>
+          <p:nvPr/>
+        </p:nvGrpSpPr>
+        <p:grpSpPr>
+          <a:xfrm>
+            <a:off x="6294524" y="2203081"/>
+            <a:ext cx="9933062" cy="4632279"/>
+            <a:chOff x="0" y="0"/>
+            <a:chExt cx="13244082" cy="6176372"/>
+          </a:xfrm>
+        </p:grpSpPr>
+        <p:pic>
+          <p:nvPicPr>
+            <p:cNvPr id="4" name="Picture 4"/>
+            <p:cNvPicPr>
+              <a:picLocks noChangeAspect="1"/>
+            </p:cNvPicPr>
+            <p:nvPr/>
+          </p:nvPicPr>
+          <p:blipFill>
+            <a:blip r:embed="rId3"/>
+            <a:srcRect l="13982" r="15911"/>
+            <a:stretch>
+              <a:fillRect/>
+            </a:stretch>
+          </p:blipFill>
+          <p:spPr>
+            <a:xfrm>
+              <a:off x="0" y="0"/>
+              <a:ext cx="4330027" cy="6176372"/>
+            </a:xfrm>
+            <a:prstGeom prst="rect">
+              <a:avLst/>
+            </a:prstGeom>
+          </p:spPr>
+        </p:pic>
+        <p:pic>
+          <p:nvPicPr>
+            <p:cNvPr id="5" name="Picture 5"/>
+            <p:cNvPicPr>
+              <a:picLocks noChangeAspect="1"/>
+            </p:cNvPicPr>
+            <p:nvPr/>
+          </p:nvPicPr>
+          <p:blipFill>
+            <a:blip r:embed="rId4"/>
+            <a:srcRect l="17326" r="18056" b="8310"/>
+            <a:stretch>
+              <a:fillRect/>
+            </a:stretch>
+          </p:blipFill>
+          <p:spPr>
+            <a:xfrm>
+              <a:off x="4457027" y="0"/>
+              <a:ext cx="4330027" cy="6176372"/>
+            </a:xfrm>
+            <a:prstGeom prst="rect">
+              <a:avLst/>
+            </a:prstGeom>
+          </p:spPr>
+        </p:pic>
+        <p:pic>
+          <p:nvPicPr>
+            <p:cNvPr id="6" name="Picture 6"/>
+            <p:cNvPicPr>
+              <a:picLocks noChangeAspect="1"/>
+            </p:cNvPicPr>
+            <p:nvPr/>
+          </p:nvPicPr>
+          <p:blipFill>
+            <a:blip r:embed="rId5"/>
+            <a:srcRect l="30413" t="12804" r="32378" b="34121"/>
+            <a:stretch>
+              <a:fillRect/>
+            </a:stretch>
+          </p:blipFill>
+          <p:spPr>
+            <a:xfrm>
+              <a:off x="8914055" y="0"/>
+              <a:ext cx="4330027" cy="6176372"/>
+            </a:xfrm>
+            <a:prstGeom prst="rect">
+              <a:avLst/>
+            </a:prstGeom>
+          </p:spPr>
+        </p:pic>
+      </p:grpSp>
+      <p:grpSp>
+        <p:nvGrpSpPr>
+          <p:cNvPr id="7" name="Group 7"/>
+          <p:cNvGrpSpPr/>
+          <p:nvPr/>
+        </p:nvGrpSpPr>
+        <p:grpSpPr>
+          <a:xfrm>
+            <a:off x="6668852" y="7216670"/>
+            <a:ext cx="2505867" cy="865173"/>
+            <a:chOff x="0" y="0"/>
+            <a:chExt cx="3341156" cy="1153564"/>
+          </a:xfrm>
+        </p:grpSpPr>
+        <p:sp>
+          <p:nvSpPr>
+            <p:cNvPr id="8" name="TextBox 8"/>
+            <p:cNvSpPr txBox="1"/>
+            <p:nvPr/>
+          </p:nvSpPr>
+          <p:spPr>
+            <a:xfrm>
+              <a:off x="0" y="677049"/>
+              <a:ext cx="3341156" cy="476515"/>
+            </a:xfrm>
+            <a:prstGeom prst="rect">
+              <a:avLst/>
+            </a:prstGeom>
+          </p:spPr>
+          <p:txBody>
+            <a:bodyPr lIns="0" tIns="0" rIns="0" bIns="0" rtlCol="0" anchor="t">
+              <a:spAutoFit/>
+            </a:bodyPr>
+            <a:lstStyle/>
+            <a:p>
+              <a:pPr algn="ctr">
+                <a:lnSpc>
+                  <a:spcPts val="3150"/>
+                </a:lnSpc>
+              </a:pPr>
+              <a:r>
+                <a:rPr lang="en-US" sz="2100" spc="21">
+                  <a:solidFill>
+                    <a:srgbClr val="111117"/>
+                  </a:solidFill>
+                  <a:latin typeface="Montserrat"/>
+                </a:rPr>
+                <a:t>Dawid</a:t>
+              </a:r>
+            </a:p>
+          </p:txBody>
+        </p:sp>
+        <p:sp>
+          <p:nvSpPr>
+            <p:cNvPr id="9" name="TextBox 9"/>
+            <p:cNvSpPr txBox="1"/>
+            <p:nvPr/>
+          </p:nvSpPr>
+          <p:spPr>
+            <a:xfrm>
+              <a:off x="0" y="-47625"/>
+              <a:ext cx="3341156" cy="533920"/>
+            </a:xfrm>
+            <a:prstGeom prst="rect">
+              <a:avLst/>
+            </a:prstGeom>
+          </p:spPr>
+          <p:txBody>
+            <a:bodyPr lIns="0" tIns="0" rIns="0" bIns="0" rtlCol="0" anchor="t">
+              <a:spAutoFit/>
+            </a:bodyPr>
+            <a:lstStyle/>
+            <a:p>
+              <a:pPr algn="ctr">
+                <a:lnSpc>
+                  <a:spcPts val="3359"/>
+                </a:lnSpc>
+              </a:pPr>
+              <a:r>
+                <a:rPr lang="en-US" sz="2400" spc="24">
+                  <a:solidFill>
+                    <a:srgbClr val="111117"/>
+                  </a:solidFill>
+                  <a:latin typeface="Montserrat Classic Bold"/>
+                </a:rPr>
+                <a:t>PRZYBYLIŃSKI</a:t>
+              </a:r>
+            </a:p>
+          </p:txBody>
+        </p:sp>
+      </p:grpSp>
+      <p:sp>
+        <p:nvSpPr>
+          <p:cNvPr id="10" name="TextBox 10"/>
+          <p:cNvSpPr txBox="1"/>
+          <p:nvPr/>
+        </p:nvSpPr>
+        <p:spPr>
+          <a:xfrm>
+            <a:off x="1847451" y="2203081"/>
+            <a:ext cx="3439277" cy="4827847"/>
+          </a:xfrm>
+          <a:prstGeom prst="rect">
+            <a:avLst/>
+          </a:prstGeom>
+        </p:spPr>
+        <p:txBody>
+          <a:bodyPr lIns="0" tIns="0" rIns="0" bIns="0" rtlCol="0" anchor="t">
+            <a:spAutoFit/>
+          </a:bodyPr>
+          <a:lstStyle/>
+          <a:p>
+            <a:pPr algn="ctr">
+              <a:lnSpc>
+                <a:spcPts val="7680"/>
+              </a:lnSpc>
+            </a:pPr>
+            <a:r>
+              <a:rPr lang="en-US" sz="6400" spc="192">
+                <a:solidFill>
+                  <a:srgbClr val="1F3CFF"/>
+                </a:solidFill>
+                <a:latin typeface="Montserrat Classic Bold"/>
+              </a:rPr>
+              <a:t>Coming soon...we will let you know!</a:t>
+            </a:r>
+          </a:p>
+        </p:txBody>
+      </p:sp>
+      <p:grpSp>
+        <p:nvGrpSpPr>
+          <p:cNvPr id="11" name="Group 11"/>
+          <p:cNvGrpSpPr/>
+          <p:nvPr/>
+        </p:nvGrpSpPr>
+        <p:grpSpPr>
+          <a:xfrm>
+            <a:off x="10008122" y="7216670"/>
+            <a:ext cx="2505867" cy="865173"/>
+            <a:chOff x="0" y="0"/>
+            <a:chExt cx="3341156" cy="1153564"/>
+          </a:xfrm>
+        </p:grpSpPr>
+        <p:sp>
+          <p:nvSpPr>
+            <p:cNvPr id="12" name="TextBox 12"/>
+            <p:cNvSpPr txBox="1"/>
+            <p:nvPr/>
+          </p:nvSpPr>
+          <p:spPr>
+            <a:xfrm>
+              <a:off x="0" y="677049"/>
+              <a:ext cx="3341156" cy="476515"/>
+            </a:xfrm>
+            <a:prstGeom prst="rect">
+              <a:avLst/>
+            </a:prstGeom>
+          </p:spPr>
+          <p:txBody>
+            <a:bodyPr lIns="0" tIns="0" rIns="0" bIns="0" rtlCol="0" anchor="t">
+              <a:spAutoFit/>
+            </a:bodyPr>
+            <a:lstStyle/>
+            <a:p>
+              <a:pPr algn="ctr">
+                <a:lnSpc>
+                  <a:spcPts val="3150"/>
+                </a:lnSpc>
+              </a:pPr>
+              <a:r>
+                <a:rPr lang="en-US" sz="2100" spc="21">
+                  <a:solidFill>
+                    <a:srgbClr val="111117"/>
+                  </a:solidFill>
+                  <a:latin typeface="Montserrat"/>
+                </a:rPr>
+                <a:t>Hanna</a:t>
+              </a:r>
+            </a:p>
+          </p:txBody>
+        </p:sp>
+        <p:sp>
+          <p:nvSpPr>
+            <p:cNvPr id="13" name="TextBox 13"/>
+            <p:cNvSpPr txBox="1"/>
+            <p:nvPr/>
+          </p:nvSpPr>
+          <p:spPr>
+            <a:xfrm>
+              <a:off x="0" y="-47625"/>
+              <a:ext cx="3341156" cy="533920"/>
+            </a:xfrm>
+            <a:prstGeom prst="rect">
+              <a:avLst/>
+            </a:prstGeom>
+          </p:spPr>
+          <p:txBody>
+            <a:bodyPr lIns="0" tIns="0" rIns="0" bIns="0" rtlCol="0" anchor="t">
+              <a:spAutoFit/>
+            </a:bodyPr>
+            <a:lstStyle/>
+            <a:p>
+              <a:pPr algn="ctr">
+                <a:lnSpc>
+                  <a:spcPts val="3359"/>
+                </a:lnSpc>
+              </a:pPr>
+              <a:r>
+                <a:rPr lang="en-US" sz="2400" spc="24">
+                  <a:solidFill>
+                    <a:srgbClr val="111117"/>
+                  </a:solidFill>
+                  <a:latin typeface="Montserrat Classic Bold"/>
+                </a:rPr>
+                <a:t>ZDULSKA</a:t>
+              </a:r>
+            </a:p>
+          </p:txBody>
+        </p:sp>
+      </p:grpSp>
+      <p:grpSp>
+        <p:nvGrpSpPr>
+          <p:cNvPr id="14" name="Group 14"/>
+          <p:cNvGrpSpPr/>
+          <p:nvPr/>
+        </p:nvGrpSpPr>
+        <p:grpSpPr>
+          <a:xfrm>
+            <a:off x="13355116" y="7216670"/>
+            <a:ext cx="2505867" cy="865173"/>
+            <a:chOff x="0" y="0"/>
+            <a:chExt cx="3341156" cy="1153564"/>
+          </a:xfrm>
+        </p:grpSpPr>
+        <p:sp>
+          <p:nvSpPr>
+            <p:cNvPr id="15" name="TextBox 15"/>
+            <p:cNvSpPr txBox="1"/>
+            <p:nvPr/>
+          </p:nvSpPr>
+          <p:spPr>
+            <a:xfrm>
+              <a:off x="0" y="677049"/>
+              <a:ext cx="3341156" cy="476515"/>
+            </a:xfrm>
+            <a:prstGeom prst="rect">
+              <a:avLst/>
+            </a:prstGeom>
+          </p:spPr>
+          <p:txBody>
+            <a:bodyPr lIns="0" tIns="0" rIns="0" bIns="0" rtlCol="0" anchor="t">
+              <a:spAutoFit/>
+            </a:bodyPr>
+            <a:lstStyle/>
+            <a:p>
+              <a:pPr algn="ctr">
+                <a:lnSpc>
+                  <a:spcPts val="3150"/>
+                </a:lnSpc>
+              </a:pPr>
+              <a:r>
+                <a:rPr lang="en-US" sz="2100" spc="21">
+                  <a:solidFill>
+                    <a:srgbClr val="111117"/>
+                  </a:solidFill>
+                  <a:latin typeface="Montserrat"/>
+                </a:rPr>
+                <a:t>Jakub</a:t>
+              </a:r>
+            </a:p>
+          </p:txBody>
+        </p:sp>
+        <p:sp>
+          <p:nvSpPr>
+            <p:cNvPr id="16" name="TextBox 16"/>
+            <p:cNvSpPr txBox="1"/>
+            <p:nvPr/>
+          </p:nvSpPr>
+          <p:spPr>
+            <a:xfrm>
+              <a:off x="0" y="-47625"/>
+              <a:ext cx="3341156" cy="533920"/>
+            </a:xfrm>
+            <a:prstGeom prst="rect">
+              <a:avLst/>
+            </a:prstGeom>
+          </p:spPr>
+          <p:txBody>
+            <a:bodyPr lIns="0" tIns="0" rIns="0" bIns="0" rtlCol="0" anchor="t">
+              <a:spAutoFit/>
+            </a:bodyPr>
+            <a:lstStyle/>
+            <a:p>
+              <a:pPr algn="ctr">
+                <a:lnSpc>
+                  <a:spcPts val="3359"/>
+                </a:lnSpc>
+              </a:pPr>
+              <a:r>
+                <a:rPr lang="en-US" sz="2400" spc="24">
+                  <a:solidFill>
+                    <a:srgbClr val="111117"/>
+                  </a:solidFill>
+                  <a:latin typeface="Montserrat Classic Bold"/>
+                </a:rPr>
+                <a:t>KOSTERNA</a:t>
+              </a:r>
+            </a:p>
+          </p:txBody>
+        </p:sp>
+      </p:grpSp>
     </p:spTree>
   </p:cSld>
   <p:clrMapOvr>

</xml_diff>